<commit_message>
fix presentation and cleanup
</commit_message>
<xml_diff>
--- a/diplomska/Физичка симулација на роботска рака - Васил Трендафилов.pptx
+++ b/diplomska/Физичка симулација на роботска рака - Васил Трендафилов.pptx
@@ -4113,7 +4113,11 @@
         <a:p>
           <a:r>
             <a:rPr lang="mk-MK" dirty="0" smtClean="0"/>
-            <a:t>преку гуи</a:t>
+            <a:t>преку </a:t>
+          </a:r>
+          <a:r>
+            <a:rPr lang="mk-MK" dirty="0" smtClean="0"/>
+            <a:t>кориснички интерфејс</a:t>
           </a:r>
           <a:endParaRPr lang="en-US" dirty="0"/>
         </a:p>
@@ -4922,11 +4926,7 @@
           </a:r>
           <a:r>
             <a:rPr lang="mk-MK" dirty="0" smtClean="0"/>
-            <a:t> </a:t>
-          </a:r>
-          <a:r>
-            <a:rPr lang="mk-MK" dirty="0" smtClean="0"/>
-            <a:t>конвенција во </a:t>
+            <a:t> конвенција во </a:t>
           </a:r>
           <a:r>
             <a:rPr lang="en-US" dirty="0" smtClean="0"/>
@@ -5342,7 +5342,11 @@
         <a:p>
           <a:r>
             <a:rPr lang="mk-MK" dirty="0" smtClean="0"/>
-            <a:t>управување преку гуи</a:t>
+            <a:t>управување преку </a:t>
+          </a:r>
+          <a:r>
+            <a:rPr lang="mk-MK" dirty="0" smtClean="0"/>
+            <a:t>кориснички интерфејс</a:t>
           </a:r>
           <a:endParaRPr lang="en-US" dirty="0"/>
         </a:p>
@@ -5729,11 +5733,7 @@
         <a:p>
           <a:r>
             <a:rPr lang="mk-MK" dirty="0" smtClean="0"/>
-            <a:t>преместување кон </a:t>
-          </a:r>
-          <a:r>
-            <a:rPr lang="mk-MK" dirty="0" smtClean="0"/>
-            <a:t>точка</a:t>
+            <a:t>преместување кон точка</a:t>
           </a:r>
           <a:endParaRPr lang="en-US" dirty="0"/>
         </a:p>
@@ -6188,11 +6188,7 @@
         <a:p>
           <a:r>
             <a:rPr lang="mk-MK" dirty="0" smtClean="0"/>
-            <a:t>запис на </a:t>
-          </a:r>
-          <a:r>
-            <a:rPr lang="mk-MK" dirty="0" smtClean="0"/>
-            <a:t>зглобовите</a:t>
+            <a:t>запис на зглобовите</a:t>
           </a:r>
           <a:endParaRPr lang="en-US" dirty="0"/>
         </a:p>
@@ -6303,15 +6299,7 @@
         <a:p>
           <a:r>
             <a:rPr lang="mk-MK" dirty="0" smtClean="0"/>
-            <a:t>управување </a:t>
-          </a:r>
-          <a:r>
-            <a:rPr lang="mk-MK" dirty="0" smtClean="0"/>
-            <a:t>на </a:t>
-          </a:r>
-          <a:r>
-            <a:rPr lang="mk-MK" dirty="0" smtClean="0"/>
-            <a:t>додатокот</a:t>
+            <a:t>управување на додатокот</a:t>
           </a:r>
           <a:endParaRPr lang="en-US" dirty="0"/>
         </a:p>
@@ -7283,12 +7271,12 @@
         </a:fontRef>
       </dsp:style>
       <dsp:txBody>
-        <a:bodyPr spcFirstLastPara="0" vert="horz" wrap="square" lIns="14605" tIns="14605" rIns="14605" bIns="14605" numCol="1" spcCol="1270" anchor="ctr" anchorCtr="0">
+        <a:bodyPr spcFirstLastPara="0" vert="horz" wrap="square" lIns="13970" tIns="13970" rIns="13970" bIns="13970" numCol="1" spcCol="1270" anchor="ctr" anchorCtr="0">
           <a:noAutofit/>
         </a:bodyPr>
         <a:lstStyle/>
         <a:p>
-          <a:pPr lvl="0" algn="ctr" defTabSz="1022350">
+          <a:pPr lvl="0" algn="ctr" defTabSz="977900">
             <a:lnSpc>
               <a:spcPct val="90000"/>
             </a:lnSpc>
@@ -7300,10 +7288,10 @@
             </a:spcAft>
           </a:pPr>
           <a:r>
-            <a:rPr lang="mk-MK" sz="2300" kern="1200" dirty="0" smtClean="0"/>
+            <a:rPr lang="mk-MK" sz="2200" kern="1200" dirty="0" smtClean="0"/>
             <a:t>симулација</a:t>
           </a:r>
-          <a:endParaRPr lang="en-US" sz="2300" kern="1200" dirty="0"/>
+          <a:endParaRPr lang="en-US" sz="2200" kern="1200" dirty="0"/>
         </a:p>
       </dsp:txBody>
       <dsp:txXfrm>
@@ -7360,12 +7348,12 @@
         </a:fontRef>
       </dsp:style>
       <dsp:txBody>
-        <a:bodyPr spcFirstLastPara="0" vert="horz" wrap="square" lIns="14605" tIns="14605" rIns="14605" bIns="14605" numCol="1" spcCol="1270" anchor="ctr" anchorCtr="0">
+        <a:bodyPr spcFirstLastPara="0" vert="horz" wrap="square" lIns="13970" tIns="13970" rIns="13970" bIns="13970" numCol="1" spcCol="1270" anchor="ctr" anchorCtr="0">
           <a:noAutofit/>
         </a:bodyPr>
         <a:lstStyle/>
         <a:p>
-          <a:pPr lvl="0" algn="ctr" defTabSz="1022350">
+          <a:pPr lvl="0" algn="ctr" defTabSz="977900">
             <a:lnSpc>
               <a:spcPct val="90000"/>
             </a:lnSpc>
@@ -7377,10 +7365,10 @@
             </a:spcAft>
           </a:pPr>
           <a:r>
-            <a:rPr lang="mk-MK" sz="2300" kern="1200" dirty="0" smtClean="0"/>
+            <a:rPr lang="mk-MK" sz="2200" kern="1200" dirty="0" smtClean="0"/>
             <a:t>симулациски свет</a:t>
           </a:r>
-          <a:endParaRPr lang="en-US" sz="2300" kern="1200" dirty="0"/>
+          <a:endParaRPr lang="en-US" sz="2200" kern="1200" dirty="0"/>
         </a:p>
       </dsp:txBody>
       <dsp:txXfrm>
@@ -7437,12 +7425,12 @@
         </a:fontRef>
       </dsp:style>
       <dsp:txBody>
-        <a:bodyPr spcFirstLastPara="0" vert="horz" wrap="square" lIns="14605" tIns="14605" rIns="14605" bIns="14605" numCol="1" spcCol="1270" anchor="ctr" anchorCtr="0">
+        <a:bodyPr spcFirstLastPara="0" vert="horz" wrap="square" lIns="13970" tIns="13970" rIns="13970" bIns="13970" numCol="1" spcCol="1270" anchor="ctr" anchorCtr="0">
           <a:noAutofit/>
         </a:bodyPr>
         <a:lstStyle/>
         <a:p>
-          <a:pPr lvl="0" algn="ctr" defTabSz="1022350">
+          <a:pPr lvl="0" algn="ctr" defTabSz="977900">
             <a:lnSpc>
               <a:spcPct val="90000"/>
             </a:lnSpc>
@@ -7454,10 +7442,10 @@
             </a:spcAft>
           </a:pPr>
           <a:r>
-            <a:rPr lang="mk-MK" sz="2300" kern="1200" dirty="0" smtClean="0"/>
+            <a:rPr lang="mk-MK" sz="2200" kern="1200" dirty="0" smtClean="0"/>
             <a:t>роботкса рака</a:t>
           </a:r>
-          <a:endParaRPr lang="en-US" sz="2300" kern="1200" dirty="0"/>
+          <a:endParaRPr lang="en-US" sz="2200" kern="1200" dirty="0"/>
         </a:p>
       </dsp:txBody>
       <dsp:txXfrm>
@@ -7514,12 +7502,12 @@
         </a:fontRef>
       </dsp:style>
       <dsp:txBody>
-        <a:bodyPr spcFirstLastPara="0" vert="horz" wrap="square" lIns="14605" tIns="14605" rIns="14605" bIns="14605" numCol="1" spcCol="1270" anchor="ctr" anchorCtr="0">
+        <a:bodyPr spcFirstLastPara="0" vert="horz" wrap="square" lIns="13970" tIns="13970" rIns="13970" bIns="13970" numCol="1" spcCol="1270" anchor="ctr" anchorCtr="0">
           <a:noAutofit/>
         </a:bodyPr>
         <a:lstStyle/>
         <a:p>
-          <a:pPr lvl="0" algn="ctr" defTabSz="1022350">
+          <a:pPr lvl="0" algn="ctr" defTabSz="977900">
             <a:lnSpc>
               <a:spcPct val="90000"/>
             </a:lnSpc>
@@ -7531,10 +7519,10 @@
             </a:spcAft>
           </a:pPr>
           <a:r>
-            <a:rPr lang="mk-MK" sz="2300" kern="1200" dirty="0" smtClean="0"/>
+            <a:rPr lang="mk-MK" sz="2200" kern="1200" dirty="0" smtClean="0"/>
             <a:t>иницијализација</a:t>
           </a:r>
-          <a:endParaRPr lang="en-US" sz="2300" kern="1200" dirty="0"/>
+          <a:endParaRPr lang="en-US" sz="2200" kern="1200" dirty="0"/>
         </a:p>
       </dsp:txBody>
       <dsp:txXfrm>
@@ -7591,12 +7579,12 @@
         </a:fontRef>
       </dsp:style>
       <dsp:txBody>
-        <a:bodyPr spcFirstLastPara="0" vert="horz" wrap="square" lIns="14605" tIns="14605" rIns="14605" bIns="14605" numCol="1" spcCol="1270" anchor="ctr" anchorCtr="0">
+        <a:bodyPr spcFirstLastPara="0" vert="horz" wrap="square" lIns="13970" tIns="13970" rIns="13970" bIns="13970" numCol="1" spcCol="1270" anchor="ctr" anchorCtr="0">
           <a:noAutofit/>
         </a:bodyPr>
         <a:lstStyle/>
         <a:p>
-          <a:pPr lvl="0" algn="ctr" defTabSz="1022350">
+          <a:pPr lvl="0" algn="ctr" defTabSz="977900">
             <a:lnSpc>
               <a:spcPct val="90000"/>
             </a:lnSpc>
@@ -7608,10 +7596,10 @@
             </a:spcAft>
           </a:pPr>
           <a:r>
-            <a:rPr lang="mk-MK" sz="2300" kern="1200" dirty="0" smtClean="0"/>
+            <a:rPr lang="mk-MK" sz="2200" kern="1200" dirty="0" smtClean="0"/>
             <a:t>управување </a:t>
           </a:r>
-          <a:endParaRPr lang="en-US" sz="2300" kern="1200" dirty="0"/>
+          <a:endParaRPr lang="en-US" sz="2200" kern="1200" dirty="0"/>
         </a:p>
       </dsp:txBody>
       <dsp:txXfrm>
@@ -7668,12 +7656,12 @@
         </a:fontRef>
       </dsp:style>
       <dsp:txBody>
-        <a:bodyPr spcFirstLastPara="0" vert="horz" wrap="square" lIns="14605" tIns="14605" rIns="14605" bIns="14605" numCol="1" spcCol="1270" anchor="ctr" anchorCtr="0">
+        <a:bodyPr spcFirstLastPara="0" vert="horz" wrap="square" lIns="13970" tIns="13970" rIns="13970" bIns="13970" numCol="1" spcCol="1270" anchor="ctr" anchorCtr="0">
           <a:noAutofit/>
         </a:bodyPr>
         <a:lstStyle/>
         <a:p>
-          <a:pPr lvl="0" algn="ctr" defTabSz="1022350">
+          <a:pPr lvl="0" algn="ctr" defTabSz="977900">
             <a:lnSpc>
               <a:spcPct val="90000"/>
             </a:lnSpc>
@@ -7685,10 +7673,14 @@
             </a:spcAft>
           </a:pPr>
           <a:r>
-            <a:rPr lang="mk-MK" sz="2300" kern="1200" dirty="0" smtClean="0"/>
-            <a:t>преку гуи</a:t>
+            <a:rPr lang="mk-MK" sz="2200" kern="1200" dirty="0" smtClean="0"/>
+            <a:t>преку </a:t>
           </a:r>
-          <a:endParaRPr lang="en-US" sz="2300" kern="1200" dirty="0"/>
+          <a:r>
+            <a:rPr lang="mk-MK" sz="2200" kern="1200" dirty="0" smtClean="0"/>
+            <a:t>кориснички интерфејс</a:t>
+          </a:r>
+          <a:endParaRPr lang="en-US" sz="2200" kern="1200" dirty="0"/>
         </a:p>
       </dsp:txBody>
       <dsp:txXfrm>
@@ -7745,12 +7737,12 @@
         </a:fontRef>
       </dsp:style>
       <dsp:txBody>
-        <a:bodyPr spcFirstLastPara="0" vert="horz" wrap="square" lIns="14605" tIns="14605" rIns="14605" bIns="14605" numCol="1" spcCol="1270" anchor="ctr" anchorCtr="0">
+        <a:bodyPr spcFirstLastPara="0" vert="horz" wrap="square" lIns="13970" tIns="13970" rIns="13970" bIns="13970" numCol="1" spcCol="1270" anchor="ctr" anchorCtr="0">
           <a:noAutofit/>
         </a:bodyPr>
         <a:lstStyle/>
         <a:p>
-          <a:pPr lvl="0" algn="ctr" defTabSz="1022350">
+          <a:pPr lvl="0" algn="ctr" defTabSz="977900">
             <a:lnSpc>
               <a:spcPct val="90000"/>
             </a:lnSpc>
@@ -7762,10 +7754,10 @@
             </a:spcAft>
           </a:pPr>
           <a:r>
-            <a:rPr lang="mk-MK" sz="2300" kern="1200" dirty="0" smtClean="0"/>
+            <a:rPr lang="mk-MK" sz="2200" kern="1200" dirty="0" smtClean="0"/>
             <a:t>преку команди </a:t>
           </a:r>
-          <a:endParaRPr lang="en-US" sz="2300" kern="1200" dirty="0"/>
+          <a:endParaRPr lang="en-US" sz="2200" kern="1200" dirty="0"/>
         </a:p>
       </dsp:txBody>
       <dsp:txXfrm>
@@ -7822,12 +7814,12 @@
         </a:fontRef>
       </dsp:style>
       <dsp:txBody>
-        <a:bodyPr spcFirstLastPara="0" vert="horz" wrap="square" lIns="14605" tIns="14605" rIns="14605" bIns="14605" numCol="1" spcCol="1270" anchor="ctr" anchorCtr="0">
+        <a:bodyPr spcFirstLastPara="0" vert="horz" wrap="square" lIns="13970" tIns="13970" rIns="13970" bIns="13970" numCol="1" spcCol="1270" anchor="ctr" anchorCtr="0">
           <a:noAutofit/>
         </a:bodyPr>
         <a:lstStyle/>
         <a:p>
-          <a:pPr lvl="0" algn="ctr" defTabSz="1022350">
+          <a:pPr lvl="0" algn="ctr" defTabSz="977900">
             <a:lnSpc>
               <a:spcPct val="90000"/>
             </a:lnSpc>
@@ -7839,10 +7831,10 @@
             </a:spcAft>
           </a:pPr>
           <a:r>
-            <a:rPr lang="mk-MK" sz="2300" kern="1200" dirty="0" smtClean="0"/>
+            <a:rPr lang="mk-MK" sz="2200" kern="1200" dirty="0" smtClean="0"/>
             <a:t>модули на раката</a:t>
           </a:r>
-          <a:endParaRPr lang="en-US" sz="2300" kern="1200" dirty="0"/>
+          <a:endParaRPr lang="en-US" sz="2200" kern="1200" dirty="0"/>
         </a:p>
       </dsp:txBody>
       <dsp:txXfrm>
@@ -8323,11 +8315,7 @@
           </a:r>
           <a:r>
             <a:rPr lang="mk-MK" sz="2400" kern="1200" dirty="0" smtClean="0"/>
-            <a:t> </a:t>
-          </a:r>
-          <a:r>
-            <a:rPr lang="mk-MK" sz="2400" kern="1200" dirty="0" smtClean="0"/>
-            <a:t>конвенција во </a:t>
+            <a:t> конвенција во </a:t>
           </a:r>
           <a:r>
             <a:rPr lang="en-US" sz="2400" kern="1200" dirty="0" smtClean="0"/>
@@ -8678,12 +8666,12 @@
         </a:fontRef>
       </dsp:style>
       <dsp:txBody>
-        <a:bodyPr spcFirstLastPara="0" vert="horz" wrap="square" lIns="29845" tIns="29845" rIns="29845" bIns="29845" numCol="1" spcCol="1270" anchor="ctr" anchorCtr="0">
+        <a:bodyPr spcFirstLastPara="0" vert="horz" wrap="square" lIns="21590" tIns="21590" rIns="21590" bIns="21590" numCol="1" spcCol="1270" anchor="ctr" anchorCtr="0">
           <a:noAutofit/>
         </a:bodyPr>
         <a:lstStyle/>
         <a:p>
-          <a:pPr lvl="0" algn="ctr" defTabSz="2089150">
+          <a:pPr lvl="0" algn="ctr" defTabSz="1511300">
             <a:lnSpc>
               <a:spcPct val="90000"/>
             </a:lnSpc>
@@ -8695,10 +8683,14 @@
             </a:spcAft>
           </a:pPr>
           <a:r>
-            <a:rPr lang="mk-MK" sz="4700" kern="1200" dirty="0" smtClean="0"/>
-            <a:t>управување преку гуи</a:t>
+            <a:rPr lang="mk-MK" sz="3400" kern="1200" dirty="0" smtClean="0"/>
+            <a:t>управување преку </a:t>
           </a:r>
-          <a:endParaRPr lang="en-US" sz="4700" kern="1200" dirty="0"/>
+          <a:r>
+            <a:rPr lang="mk-MK" sz="3400" kern="1200" dirty="0" smtClean="0"/>
+            <a:t>кориснички интерфејс</a:t>
+          </a:r>
+          <a:endParaRPr lang="en-US" sz="3400" kern="1200" dirty="0"/>
         </a:p>
       </dsp:txBody>
       <dsp:txXfrm>
@@ -8755,12 +8747,12 @@
         </a:fontRef>
       </dsp:style>
       <dsp:txBody>
-        <a:bodyPr spcFirstLastPara="0" vert="horz" wrap="square" lIns="29845" tIns="29845" rIns="29845" bIns="29845" numCol="1" spcCol="1270" anchor="ctr" anchorCtr="0">
+        <a:bodyPr spcFirstLastPara="0" vert="horz" wrap="square" lIns="21590" tIns="21590" rIns="21590" bIns="21590" numCol="1" spcCol="1270" anchor="ctr" anchorCtr="0">
           <a:noAutofit/>
         </a:bodyPr>
         <a:lstStyle/>
         <a:p>
-          <a:pPr lvl="0" algn="ctr" defTabSz="2089150">
+          <a:pPr lvl="0" algn="ctr" defTabSz="1511300">
             <a:lnSpc>
               <a:spcPct val="90000"/>
             </a:lnSpc>
@@ -8772,10 +8764,10 @@
             </a:spcAft>
           </a:pPr>
           <a:r>
-            <a:rPr lang="mk-MK" sz="4700" kern="1200" dirty="0" smtClean="0"/>
+            <a:rPr lang="mk-MK" sz="3400" kern="1200" dirty="0" smtClean="0"/>
             <a:t>директна кинематика</a:t>
           </a:r>
-          <a:endParaRPr lang="en-US" sz="4700" kern="1200" dirty="0"/>
+          <a:endParaRPr lang="en-US" sz="3400" kern="1200" dirty="0"/>
         </a:p>
       </dsp:txBody>
       <dsp:txXfrm>
@@ -8832,12 +8824,12 @@
         </a:fontRef>
       </dsp:style>
       <dsp:txBody>
-        <a:bodyPr spcFirstLastPara="0" vert="horz" wrap="square" lIns="29845" tIns="29845" rIns="29845" bIns="29845" numCol="1" spcCol="1270" anchor="ctr" anchorCtr="0">
+        <a:bodyPr spcFirstLastPara="0" vert="horz" wrap="square" lIns="21590" tIns="21590" rIns="21590" bIns="21590" numCol="1" spcCol="1270" anchor="ctr" anchorCtr="0">
           <a:noAutofit/>
         </a:bodyPr>
         <a:lstStyle/>
         <a:p>
-          <a:pPr lvl="0" algn="ctr" defTabSz="2089150">
+          <a:pPr lvl="0" algn="ctr" defTabSz="1511300">
             <a:lnSpc>
               <a:spcPct val="90000"/>
             </a:lnSpc>
@@ -8849,10 +8841,10 @@
             </a:spcAft>
           </a:pPr>
           <a:r>
-            <a:rPr lang="mk-MK" sz="4700" kern="1200" dirty="0" smtClean="0"/>
+            <a:rPr lang="mk-MK" sz="3400" kern="1200" dirty="0" smtClean="0"/>
             <a:t>инверзна кинематика</a:t>
           </a:r>
-          <a:endParaRPr lang="en-US" sz="4700" kern="1200" dirty="0"/>
+          <a:endParaRPr lang="en-US" sz="3400" kern="1200" dirty="0"/>
         </a:p>
       </dsp:txBody>
       <dsp:txXfrm>
@@ -9181,11 +9173,7 @@
           </a:pPr>
           <a:r>
             <a:rPr lang="mk-MK" sz="2300" kern="1200" dirty="0" smtClean="0"/>
-            <a:t>преместување кон </a:t>
-          </a:r>
-          <a:r>
-            <a:rPr lang="mk-MK" sz="2300" kern="1200" dirty="0" smtClean="0"/>
-            <a:t>точка</a:t>
+            <a:t>преместување кон точка</a:t>
           </a:r>
           <a:endParaRPr lang="en-US" sz="2300" kern="1200" dirty="0"/>
         </a:p>
@@ -9361,779 +9349,6 @@
       <dsp:cNvGrpSpPr/>
     </dsp:nvGrpSpPr>
     <dsp:grpSpPr/>
-    <dsp:sp modelId="{1970CB18-AEF0-4C5B-A857-A82FEFD5586C}">
-      <dsp:nvSpPr>
-        <dsp:cNvPr id="0" name=""/>
-        <dsp:cNvSpPr/>
-      </dsp:nvSpPr>
-      <dsp:spPr>
-        <a:xfrm>
-          <a:off x="5197475" y="1468898"/>
-          <a:ext cx="4306760" cy="373727"/>
-        </a:xfrm>
-        <a:custGeom>
-          <a:avLst/>
-          <a:gdLst/>
-          <a:ahLst/>
-          <a:cxnLst/>
-          <a:rect l="0" t="0" r="0" b="0"/>
-          <a:pathLst>
-            <a:path>
-              <a:moveTo>
-                <a:pt x="0" y="0"/>
-              </a:moveTo>
-              <a:lnTo>
-                <a:pt x="0" y="186863"/>
-              </a:lnTo>
-              <a:lnTo>
-                <a:pt x="4306760" y="186863"/>
-              </a:lnTo>
-              <a:lnTo>
-                <a:pt x="4306760" y="373727"/>
-              </a:lnTo>
-            </a:path>
-          </a:pathLst>
-        </a:custGeom>
-        <a:noFill/>
-        <a:ln w="19050" cap="flat" cmpd="sng" algn="ctr">
-          <a:solidFill>
-            <a:schemeClr val="accent1">
-              <a:shade val="60000"/>
-              <a:hueOff val="0"/>
-              <a:satOff val="0"/>
-              <a:lumOff val="0"/>
-              <a:alphaOff val="0"/>
-            </a:schemeClr>
-          </a:solidFill>
-          <a:prstDash val="solid"/>
-        </a:ln>
-        <a:effectLst/>
-      </dsp:spPr>
-      <dsp:style>
-        <a:lnRef idx="2">
-          <a:scrgbClr r="0" g="0" b="0"/>
-        </a:lnRef>
-        <a:fillRef idx="0">
-          <a:scrgbClr r="0" g="0" b="0"/>
-        </a:fillRef>
-        <a:effectRef idx="0">
-          <a:scrgbClr r="0" g="0" b="0"/>
-        </a:effectRef>
-        <a:fontRef idx="minor"/>
-      </dsp:style>
-    </dsp:sp>
-    <dsp:sp modelId="{01B2A45E-6992-4907-B4E6-75CB0D2246A7}">
-      <dsp:nvSpPr>
-        <dsp:cNvPr id="0" name=""/>
-        <dsp:cNvSpPr/>
-      </dsp:nvSpPr>
-      <dsp:spPr>
-        <a:xfrm>
-          <a:off x="5197475" y="1468898"/>
-          <a:ext cx="2153380" cy="373727"/>
-        </a:xfrm>
-        <a:custGeom>
-          <a:avLst/>
-          <a:gdLst/>
-          <a:ahLst/>
-          <a:cxnLst/>
-          <a:rect l="0" t="0" r="0" b="0"/>
-          <a:pathLst>
-            <a:path>
-              <a:moveTo>
-                <a:pt x="0" y="0"/>
-              </a:moveTo>
-              <a:lnTo>
-                <a:pt x="0" y="186863"/>
-              </a:lnTo>
-              <a:lnTo>
-                <a:pt x="2153380" y="186863"/>
-              </a:lnTo>
-              <a:lnTo>
-                <a:pt x="2153380" y="373727"/>
-              </a:lnTo>
-            </a:path>
-          </a:pathLst>
-        </a:custGeom>
-        <a:noFill/>
-        <a:ln w="19050" cap="flat" cmpd="sng" algn="ctr">
-          <a:solidFill>
-            <a:schemeClr val="accent1">
-              <a:shade val="60000"/>
-              <a:hueOff val="0"/>
-              <a:satOff val="0"/>
-              <a:lumOff val="0"/>
-              <a:alphaOff val="0"/>
-            </a:schemeClr>
-          </a:solidFill>
-          <a:prstDash val="solid"/>
-        </a:ln>
-        <a:effectLst/>
-      </dsp:spPr>
-      <dsp:style>
-        <a:lnRef idx="2">
-          <a:scrgbClr r="0" g="0" b="0"/>
-        </a:lnRef>
-        <a:fillRef idx="0">
-          <a:scrgbClr r="0" g="0" b="0"/>
-        </a:fillRef>
-        <a:effectRef idx="0">
-          <a:scrgbClr r="0" g="0" b="0"/>
-        </a:effectRef>
-        <a:fontRef idx="minor"/>
-      </dsp:style>
-    </dsp:sp>
-    <dsp:sp modelId="{6D693FBE-9190-4CAA-9CE4-BAA3DC181499}">
-      <dsp:nvSpPr>
-        <dsp:cNvPr id="0" name=""/>
-        <dsp:cNvSpPr/>
-      </dsp:nvSpPr>
-      <dsp:spPr>
-        <a:xfrm>
-          <a:off x="5151754" y="1468898"/>
-          <a:ext cx="91440" cy="373727"/>
-        </a:xfrm>
-        <a:custGeom>
-          <a:avLst/>
-          <a:gdLst/>
-          <a:ahLst/>
-          <a:cxnLst/>
-          <a:rect l="0" t="0" r="0" b="0"/>
-          <a:pathLst>
-            <a:path>
-              <a:moveTo>
-                <a:pt x="45720" y="0"/>
-              </a:moveTo>
-              <a:lnTo>
-                <a:pt x="45720" y="373727"/>
-              </a:lnTo>
-            </a:path>
-          </a:pathLst>
-        </a:custGeom>
-        <a:noFill/>
-        <a:ln w="19050" cap="flat" cmpd="sng" algn="ctr">
-          <a:solidFill>
-            <a:schemeClr val="accent1">
-              <a:shade val="60000"/>
-              <a:hueOff val="0"/>
-              <a:satOff val="0"/>
-              <a:lumOff val="0"/>
-              <a:alphaOff val="0"/>
-            </a:schemeClr>
-          </a:solidFill>
-          <a:prstDash val="solid"/>
-        </a:ln>
-        <a:effectLst/>
-      </dsp:spPr>
-      <dsp:style>
-        <a:lnRef idx="2">
-          <a:scrgbClr r="0" g="0" b="0"/>
-        </a:lnRef>
-        <a:fillRef idx="0">
-          <a:scrgbClr r="0" g="0" b="0"/>
-        </a:fillRef>
-        <a:effectRef idx="0">
-          <a:scrgbClr r="0" g="0" b="0"/>
-        </a:effectRef>
-        <a:fontRef idx="minor"/>
-      </dsp:style>
-    </dsp:sp>
-    <dsp:sp modelId="{3DF030CF-6B46-47EC-9C2F-BAA6ED3F3DA0}">
-      <dsp:nvSpPr>
-        <dsp:cNvPr id="0" name=""/>
-        <dsp:cNvSpPr/>
-      </dsp:nvSpPr>
-      <dsp:spPr>
-        <a:xfrm>
-          <a:off x="3044094" y="1468898"/>
-          <a:ext cx="2153380" cy="373727"/>
-        </a:xfrm>
-        <a:custGeom>
-          <a:avLst/>
-          <a:gdLst/>
-          <a:ahLst/>
-          <a:cxnLst/>
-          <a:rect l="0" t="0" r="0" b="0"/>
-          <a:pathLst>
-            <a:path>
-              <a:moveTo>
-                <a:pt x="2153380" y="0"/>
-              </a:moveTo>
-              <a:lnTo>
-                <a:pt x="2153380" y="186863"/>
-              </a:lnTo>
-              <a:lnTo>
-                <a:pt x="0" y="186863"/>
-              </a:lnTo>
-              <a:lnTo>
-                <a:pt x="0" y="373727"/>
-              </a:lnTo>
-            </a:path>
-          </a:pathLst>
-        </a:custGeom>
-        <a:noFill/>
-        <a:ln w="19050" cap="flat" cmpd="sng" algn="ctr">
-          <a:solidFill>
-            <a:schemeClr val="accent1">
-              <a:shade val="60000"/>
-              <a:hueOff val="0"/>
-              <a:satOff val="0"/>
-              <a:lumOff val="0"/>
-              <a:alphaOff val="0"/>
-            </a:schemeClr>
-          </a:solidFill>
-          <a:prstDash val="solid"/>
-        </a:ln>
-        <a:effectLst/>
-      </dsp:spPr>
-      <dsp:style>
-        <a:lnRef idx="2">
-          <a:scrgbClr r="0" g="0" b="0"/>
-        </a:lnRef>
-        <a:fillRef idx="0">
-          <a:scrgbClr r="0" g="0" b="0"/>
-        </a:fillRef>
-        <a:effectRef idx="0">
-          <a:scrgbClr r="0" g="0" b="0"/>
-        </a:effectRef>
-        <a:fontRef idx="minor"/>
-      </dsp:style>
-    </dsp:sp>
-    <dsp:sp modelId="{DBF299CE-DBF8-4CA5-B801-D880B6A4C3B0}">
-      <dsp:nvSpPr>
-        <dsp:cNvPr id="0" name=""/>
-        <dsp:cNvSpPr/>
-      </dsp:nvSpPr>
-      <dsp:spPr>
-        <a:xfrm>
-          <a:off x="890714" y="1468898"/>
-          <a:ext cx="4306760" cy="373727"/>
-        </a:xfrm>
-        <a:custGeom>
-          <a:avLst/>
-          <a:gdLst/>
-          <a:ahLst/>
-          <a:cxnLst/>
-          <a:rect l="0" t="0" r="0" b="0"/>
-          <a:pathLst>
-            <a:path>
-              <a:moveTo>
-                <a:pt x="4306760" y="0"/>
-              </a:moveTo>
-              <a:lnTo>
-                <a:pt x="4306760" y="186863"/>
-              </a:lnTo>
-              <a:lnTo>
-                <a:pt x="0" y="186863"/>
-              </a:lnTo>
-              <a:lnTo>
-                <a:pt x="0" y="373727"/>
-              </a:lnTo>
-            </a:path>
-          </a:pathLst>
-        </a:custGeom>
-        <a:noFill/>
-        <a:ln w="19050" cap="flat" cmpd="sng" algn="ctr">
-          <a:solidFill>
-            <a:schemeClr val="accent1">
-              <a:shade val="60000"/>
-              <a:hueOff val="0"/>
-              <a:satOff val="0"/>
-              <a:lumOff val="0"/>
-              <a:alphaOff val="0"/>
-            </a:schemeClr>
-          </a:solidFill>
-          <a:prstDash val="solid"/>
-        </a:ln>
-        <a:effectLst/>
-      </dsp:spPr>
-      <dsp:style>
-        <a:lnRef idx="2">
-          <a:scrgbClr r="0" g="0" b="0"/>
-        </a:lnRef>
-        <a:fillRef idx="0">
-          <a:scrgbClr r="0" g="0" b="0"/>
-        </a:fillRef>
-        <a:effectRef idx="0">
-          <a:scrgbClr r="0" g="0" b="0"/>
-        </a:effectRef>
-        <a:fontRef idx="minor"/>
-      </dsp:style>
-    </dsp:sp>
-    <dsp:sp modelId="{471AEC8F-0070-4017-912C-F4BE42A7F0C0}">
-      <dsp:nvSpPr>
-        <dsp:cNvPr id="0" name=""/>
-        <dsp:cNvSpPr/>
-      </dsp:nvSpPr>
-      <dsp:spPr>
-        <a:xfrm>
-          <a:off x="4307648" y="579072"/>
-          <a:ext cx="1779652" cy="889826"/>
-        </a:xfrm>
-        <a:prstGeom prst="rect">
-          <a:avLst/>
-        </a:prstGeom>
-        <a:solidFill>
-          <a:schemeClr val="accent1">
-            <a:hueOff val="0"/>
-            <a:satOff val="0"/>
-            <a:lumOff val="0"/>
-            <a:alphaOff val="0"/>
-          </a:schemeClr>
-        </a:solidFill>
-        <a:ln w="19050" cap="flat" cmpd="sng" algn="ctr">
-          <a:solidFill>
-            <a:schemeClr val="lt1">
-              <a:hueOff val="0"/>
-              <a:satOff val="0"/>
-              <a:lumOff val="0"/>
-              <a:alphaOff val="0"/>
-            </a:schemeClr>
-          </a:solidFill>
-          <a:prstDash val="solid"/>
-        </a:ln>
-        <a:effectLst/>
-      </dsp:spPr>
-      <dsp:style>
-        <a:lnRef idx="2">
-          <a:scrgbClr r="0" g="0" b="0"/>
-        </a:lnRef>
-        <a:fillRef idx="1">
-          <a:scrgbClr r="0" g="0" b="0"/>
-        </a:fillRef>
-        <a:effectRef idx="0">
-          <a:scrgbClr r="0" g="0" b="0"/>
-        </a:effectRef>
-        <a:fontRef idx="minor">
-          <a:schemeClr val="lt1"/>
-        </a:fontRef>
-      </dsp:style>
-      <dsp:txBody>
-        <a:bodyPr spcFirstLastPara="0" vert="horz" wrap="square" lIns="12700" tIns="12700" rIns="12700" bIns="12700" numCol="1" spcCol="1270" anchor="ctr" anchorCtr="0">
-          <a:noAutofit/>
-        </a:bodyPr>
-        <a:lstStyle/>
-        <a:p>
-          <a:pPr lvl="0" algn="ctr" defTabSz="889000">
-            <a:lnSpc>
-              <a:spcPct val="90000"/>
-            </a:lnSpc>
-            <a:spcBef>
-              <a:spcPct val="0"/>
-            </a:spcBef>
-            <a:spcAft>
-              <a:spcPct val="35000"/>
-            </a:spcAft>
-          </a:pPr>
-          <a:r>
-            <a:rPr lang="mk-MK" sz="2000" kern="1200" dirty="0" smtClean="0"/>
-            <a:t>модули за раката</a:t>
-          </a:r>
-          <a:endParaRPr lang="en-US" sz="2000" kern="1200" dirty="0"/>
-        </a:p>
-      </dsp:txBody>
-      <dsp:txXfrm>
-        <a:off x="4307648" y="579072"/>
-        <a:ext cx="1779652" cy="889826"/>
-      </dsp:txXfrm>
-    </dsp:sp>
-    <dsp:sp modelId="{75F2D705-B394-422E-942C-B12A976AFFD6}">
-      <dsp:nvSpPr>
-        <dsp:cNvPr id="0" name=""/>
-        <dsp:cNvSpPr/>
-      </dsp:nvSpPr>
-      <dsp:spPr>
-        <a:xfrm>
-          <a:off x="888" y="1842626"/>
-          <a:ext cx="1779652" cy="889826"/>
-        </a:xfrm>
-        <a:prstGeom prst="rect">
-          <a:avLst/>
-        </a:prstGeom>
-        <a:solidFill>
-          <a:schemeClr val="accent1">
-            <a:hueOff val="0"/>
-            <a:satOff val="0"/>
-            <a:lumOff val="0"/>
-            <a:alphaOff val="0"/>
-          </a:schemeClr>
-        </a:solidFill>
-        <a:ln w="19050" cap="flat" cmpd="sng" algn="ctr">
-          <a:solidFill>
-            <a:schemeClr val="lt1">
-              <a:hueOff val="0"/>
-              <a:satOff val="0"/>
-              <a:lumOff val="0"/>
-              <a:alphaOff val="0"/>
-            </a:schemeClr>
-          </a:solidFill>
-          <a:prstDash val="solid"/>
-        </a:ln>
-        <a:effectLst/>
-      </dsp:spPr>
-      <dsp:style>
-        <a:lnRef idx="2">
-          <a:scrgbClr r="0" g="0" b="0"/>
-        </a:lnRef>
-        <a:fillRef idx="1">
-          <a:scrgbClr r="0" g="0" b="0"/>
-        </a:fillRef>
-        <a:effectRef idx="0">
-          <a:scrgbClr r="0" g="0" b="0"/>
-        </a:effectRef>
-        <a:fontRef idx="minor">
-          <a:schemeClr val="lt1"/>
-        </a:fontRef>
-      </dsp:style>
-      <dsp:txBody>
-        <a:bodyPr spcFirstLastPara="0" vert="horz" wrap="square" lIns="12700" tIns="12700" rIns="12700" bIns="12700" numCol="1" spcCol="1270" anchor="ctr" anchorCtr="0">
-          <a:noAutofit/>
-        </a:bodyPr>
-        <a:lstStyle/>
-        <a:p>
-          <a:pPr lvl="0" algn="ctr" defTabSz="889000">
-            <a:lnSpc>
-              <a:spcPct val="90000"/>
-            </a:lnSpc>
-            <a:spcBef>
-              <a:spcPct val="0"/>
-            </a:spcBef>
-            <a:spcAft>
-              <a:spcPct val="35000"/>
-            </a:spcAft>
-          </a:pPr>
-          <a:r>
-            <a:rPr lang="mk-MK" sz="2000" kern="1200" dirty="0" smtClean="0"/>
-            <a:t>запис на </a:t>
-          </a:r>
-          <a:r>
-            <a:rPr lang="mk-MK" sz="2000" kern="1200" dirty="0" smtClean="0"/>
-            <a:t>зглобовите</a:t>
-          </a:r>
-          <a:endParaRPr lang="en-US" sz="2000" kern="1200" dirty="0"/>
-        </a:p>
-      </dsp:txBody>
-      <dsp:txXfrm>
-        <a:off x="888" y="1842626"/>
-        <a:ext cx="1779652" cy="889826"/>
-      </dsp:txXfrm>
-    </dsp:sp>
-    <dsp:sp modelId="{55FCE90A-8EB8-4919-9EC3-3761F38C8D37}">
-      <dsp:nvSpPr>
-        <dsp:cNvPr id="0" name=""/>
-        <dsp:cNvSpPr/>
-      </dsp:nvSpPr>
-      <dsp:spPr>
-        <a:xfrm>
-          <a:off x="2154268" y="1842626"/>
-          <a:ext cx="1779652" cy="889826"/>
-        </a:xfrm>
-        <a:prstGeom prst="rect">
-          <a:avLst/>
-        </a:prstGeom>
-        <a:solidFill>
-          <a:schemeClr val="accent1">
-            <a:hueOff val="0"/>
-            <a:satOff val="0"/>
-            <a:lumOff val="0"/>
-            <a:alphaOff val="0"/>
-          </a:schemeClr>
-        </a:solidFill>
-        <a:ln w="19050" cap="flat" cmpd="sng" algn="ctr">
-          <a:solidFill>
-            <a:schemeClr val="lt1">
-              <a:hueOff val="0"/>
-              <a:satOff val="0"/>
-              <a:lumOff val="0"/>
-              <a:alphaOff val="0"/>
-            </a:schemeClr>
-          </a:solidFill>
-          <a:prstDash val="solid"/>
-        </a:ln>
-        <a:effectLst/>
-      </dsp:spPr>
-      <dsp:style>
-        <a:lnRef idx="2">
-          <a:scrgbClr r="0" g="0" b="0"/>
-        </a:lnRef>
-        <a:fillRef idx="1">
-          <a:scrgbClr r="0" g="0" b="0"/>
-        </a:fillRef>
-        <a:effectRef idx="0">
-          <a:scrgbClr r="0" g="0" b="0"/>
-        </a:effectRef>
-        <a:fontRef idx="minor">
-          <a:schemeClr val="lt1"/>
-        </a:fontRef>
-      </dsp:style>
-      <dsp:txBody>
-        <a:bodyPr spcFirstLastPara="0" vert="horz" wrap="square" lIns="12700" tIns="12700" rIns="12700" bIns="12700" numCol="1" spcCol="1270" anchor="ctr" anchorCtr="0">
-          <a:noAutofit/>
-        </a:bodyPr>
-        <a:lstStyle/>
-        <a:p>
-          <a:pPr lvl="0" algn="ctr" defTabSz="889000">
-            <a:lnSpc>
-              <a:spcPct val="90000"/>
-            </a:lnSpc>
-            <a:spcBef>
-              <a:spcPct val="0"/>
-            </a:spcBef>
-            <a:spcAft>
-              <a:spcPct val="35000"/>
-            </a:spcAft>
-          </a:pPr>
-          <a:r>
-            <a:rPr lang="mk-MK" sz="2000" kern="1200" dirty="0" smtClean="0"/>
-            <a:t>цртање на траекторија</a:t>
-          </a:r>
-          <a:endParaRPr lang="en-US" sz="2000" kern="1200" dirty="0"/>
-        </a:p>
-      </dsp:txBody>
-      <dsp:txXfrm>
-        <a:off x="2154268" y="1842626"/>
-        <a:ext cx="1779652" cy="889826"/>
-      </dsp:txXfrm>
-    </dsp:sp>
-    <dsp:sp modelId="{426763E6-A195-44D9-A8DF-9B17BAD70FEC}">
-      <dsp:nvSpPr>
-        <dsp:cNvPr id="0" name=""/>
-        <dsp:cNvSpPr/>
-      </dsp:nvSpPr>
-      <dsp:spPr>
-        <a:xfrm>
-          <a:off x="4307648" y="1842626"/>
-          <a:ext cx="1779652" cy="889826"/>
-        </a:xfrm>
-        <a:prstGeom prst="rect">
-          <a:avLst/>
-        </a:prstGeom>
-        <a:solidFill>
-          <a:schemeClr val="accent1">
-            <a:hueOff val="0"/>
-            <a:satOff val="0"/>
-            <a:lumOff val="0"/>
-            <a:alphaOff val="0"/>
-          </a:schemeClr>
-        </a:solidFill>
-        <a:ln w="19050" cap="flat" cmpd="sng" algn="ctr">
-          <a:solidFill>
-            <a:schemeClr val="lt1">
-              <a:hueOff val="0"/>
-              <a:satOff val="0"/>
-              <a:lumOff val="0"/>
-              <a:alphaOff val="0"/>
-            </a:schemeClr>
-          </a:solidFill>
-          <a:prstDash val="solid"/>
-        </a:ln>
-        <a:effectLst/>
-      </dsp:spPr>
-      <dsp:style>
-        <a:lnRef idx="2">
-          <a:scrgbClr r="0" g="0" b="0"/>
-        </a:lnRef>
-        <a:fillRef idx="1">
-          <a:scrgbClr r="0" g="0" b="0"/>
-        </a:fillRef>
-        <a:effectRef idx="0">
-          <a:scrgbClr r="0" g="0" b="0"/>
-        </a:effectRef>
-        <a:fontRef idx="minor">
-          <a:schemeClr val="lt1"/>
-        </a:fontRef>
-      </dsp:style>
-      <dsp:txBody>
-        <a:bodyPr spcFirstLastPara="0" vert="horz" wrap="square" lIns="12700" tIns="12700" rIns="12700" bIns="12700" numCol="1" spcCol="1270" anchor="ctr" anchorCtr="0">
-          <a:noAutofit/>
-        </a:bodyPr>
-        <a:lstStyle/>
-        <a:p>
-          <a:pPr lvl="0" algn="ctr" defTabSz="889000">
-            <a:lnSpc>
-              <a:spcPct val="90000"/>
-            </a:lnSpc>
-            <a:spcBef>
-              <a:spcPct val="0"/>
-            </a:spcBef>
-            <a:spcAft>
-              <a:spcPct val="35000"/>
-            </a:spcAft>
-          </a:pPr>
-          <a:r>
-            <a:rPr lang="mk-MK" sz="2000" kern="1200" dirty="0" smtClean="0"/>
-            <a:t>печатење на позиција и локација</a:t>
-          </a:r>
-          <a:endParaRPr lang="en-US" sz="2000" kern="1200" dirty="0"/>
-        </a:p>
-      </dsp:txBody>
-      <dsp:txXfrm>
-        <a:off x="4307648" y="1842626"/>
-        <a:ext cx="1779652" cy="889826"/>
-      </dsp:txXfrm>
-    </dsp:sp>
-    <dsp:sp modelId="{2150228F-8044-4F88-ABB2-442F6B1F71F7}">
-      <dsp:nvSpPr>
-        <dsp:cNvPr id="0" name=""/>
-        <dsp:cNvSpPr/>
-      </dsp:nvSpPr>
-      <dsp:spPr>
-        <a:xfrm>
-          <a:off x="6461028" y="1842626"/>
-          <a:ext cx="1779652" cy="889826"/>
-        </a:xfrm>
-        <a:prstGeom prst="rect">
-          <a:avLst/>
-        </a:prstGeom>
-        <a:solidFill>
-          <a:schemeClr val="accent1">
-            <a:hueOff val="0"/>
-            <a:satOff val="0"/>
-            <a:lumOff val="0"/>
-            <a:alphaOff val="0"/>
-          </a:schemeClr>
-        </a:solidFill>
-        <a:ln w="19050" cap="flat" cmpd="sng" algn="ctr">
-          <a:solidFill>
-            <a:schemeClr val="lt1">
-              <a:hueOff val="0"/>
-              <a:satOff val="0"/>
-              <a:lumOff val="0"/>
-              <a:alphaOff val="0"/>
-            </a:schemeClr>
-          </a:solidFill>
-          <a:prstDash val="solid"/>
-        </a:ln>
-        <a:effectLst/>
-      </dsp:spPr>
-      <dsp:style>
-        <a:lnRef idx="2">
-          <a:scrgbClr r="0" g="0" b="0"/>
-        </a:lnRef>
-        <a:fillRef idx="1">
-          <a:scrgbClr r="0" g="0" b="0"/>
-        </a:fillRef>
-        <a:effectRef idx="0">
-          <a:scrgbClr r="0" g="0" b="0"/>
-        </a:effectRef>
-        <a:fontRef idx="minor">
-          <a:schemeClr val="lt1"/>
-        </a:fontRef>
-      </dsp:style>
-      <dsp:txBody>
-        <a:bodyPr spcFirstLastPara="0" vert="horz" wrap="square" lIns="12700" tIns="12700" rIns="12700" bIns="12700" numCol="1" spcCol="1270" anchor="ctr" anchorCtr="0">
-          <a:noAutofit/>
-        </a:bodyPr>
-        <a:lstStyle/>
-        <a:p>
-          <a:pPr lvl="0" algn="ctr" defTabSz="889000">
-            <a:lnSpc>
-              <a:spcPct val="90000"/>
-            </a:lnSpc>
-            <a:spcBef>
-              <a:spcPct val="0"/>
-            </a:spcBef>
-            <a:spcAft>
-              <a:spcPct val="35000"/>
-            </a:spcAft>
-          </a:pPr>
-          <a:r>
-            <a:rPr lang="mk-MK" sz="2000" kern="1200" dirty="0" smtClean="0"/>
-            <a:t>управување </a:t>
-          </a:r>
-          <a:r>
-            <a:rPr lang="mk-MK" sz="2000" kern="1200" dirty="0" smtClean="0"/>
-            <a:t>на </a:t>
-          </a:r>
-          <a:r>
-            <a:rPr lang="mk-MK" sz="2000" kern="1200" dirty="0" smtClean="0"/>
-            <a:t>додатокот</a:t>
-          </a:r>
-          <a:endParaRPr lang="en-US" sz="2000" kern="1200" dirty="0"/>
-        </a:p>
-      </dsp:txBody>
-      <dsp:txXfrm>
-        <a:off x="6461028" y="1842626"/>
-        <a:ext cx="1779652" cy="889826"/>
-      </dsp:txXfrm>
-    </dsp:sp>
-    <dsp:sp modelId="{1F0475B6-E1D7-4E1A-B868-313B9FBD273E}">
-      <dsp:nvSpPr>
-        <dsp:cNvPr id="0" name=""/>
-        <dsp:cNvSpPr/>
-      </dsp:nvSpPr>
-      <dsp:spPr>
-        <a:xfrm>
-          <a:off x="8614408" y="1842626"/>
-          <a:ext cx="1779652" cy="889826"/>
-        </a:xfrm>
-        <a:prstGeom prst="rect">
-          <a:avLst/>
-        </a:prstGeom>
-        <a:solidFill>
-          <a:schemeClr val="accent1">
-            <a:hueOff val="0"/>
-            <a:satOff val="0"/>
-            <a:lumOff val="0"/>
-            <a:alphaOff val="0"/>
-          </a:schemeClr>
-        </a:solidFill>
-        <a:ln w="19050" cap="flat" cmpd="sng" algn="ctr">
-          <a:solidFill>
-            <a:schemeClr val="lt1">
-              <a:hueOff val="0"/>
-              <a:satOff val="0"/>
-              <a:lumOff val="0"/>
-              <a:alphaOff val="0"/>
-            </a:schemeClr>
-          </a:solidFill>
-          <a:prstDash val="solid"/>
-        </a:ln>
-        <a:effectLst/>
-      </dsp:spPr>
-      <dsp:style>
-        <a:lnRef idx="2">
-          <a:scrgbClr r="0" g="0" b="0"/>
-        </a:lnRef>
-        <a:fillRef idx="1">
-          <a:scrgbClr r="0" g="0" b="0"/>
-        </a:fillRef>
-        <a:effectRef idx="0">
-          <a:scrgbClr r="0" g="0" b="0"/>
-        </a:effectRef>
-        <a:fontRef idx="minor">
-          <a:schemeClr val="lt1"/>
-        </a:fontRef>
-      </dsp:style>
-      <dsp:txBody>
-        <a:bodyPr spcFirstLastPara="0" vert="horz" wrap="square" lIns="12700" tIns="12700" rIns="12700" bIns="12700" numCol="1" spcCol="1270" anchor="ctr" anchorCtr="0">
-          <a:noAutofit/>
-        </a:bodyPr>
-        <a:lstStyle/>
-        <a:p>
-          <a:pPr lvl="0" algn="ctr" defTabSz="889000">
-            <a:lnSpc>
-              <a:spcPct val="90000"/>
-            </a:lnSpc>
-            <a:spcBef>
-              <a:spcPct val="0"/>
-            </a:spcBef>
-            <a:spcAft>
-              <a:spcPct val="35000"/>
-            </a:spcAft>
-          </a:pPr>
-          <a:r>
-            <a:rPr lang="mk-MK" sz="2000" kern="1200" dirty="0" smtClean="0"/>
-            <a:t>сикање во симулацијата</a:t>
-          </a:r>
-          <a:endParaRPr lang="en-US" sz="2000" kern="1200" dirty="0"/>
-        </a:p>
-      </dsp:txBody>
-      <dsp:txXfrm>
-        <a:off x="8614408" y="1842626"/>
-        <a:ext cx="1779652" cy="889826"/>
-      </dsp:txXfrm>
-    </dsp:sp>
   </dsp:spTree>
 </dsp:drawing>
 </file>
@@ -21644,7 +20859,7 @@
           <a:p>
             <a:fld id="{94826113-A126-4081-8B9E-CD62F364118C}" type="datetimeFigureOut">
               <a:rPr lang="mk-MK" smtClean="0"/>
-              <a:t>24.12.2022</a:t>
+              <a:t>29.12.2022</a:t>
             </a:fld>
             <a:endParaRPr lang="mk-MK"/>
           </a:p>
@@ -21981,7 +21196,7 @@
           <a:p>
             <a:fld id="{94826113-A126-4081-8B9E-CD62F364118C}" type="datetimeFigureOut">
               <a:rPr lang="mk-MK" smtClean="0"/>
-              <a:t>24.12.2022</a:t>
+              <a:t>29.12.2022</a:t>
             </a:fld>
             <a:endParaRPr lang="mk-MK"/>
           </a:p>
@@ -22177,7 +21392,7 @@
           <a:p>
             <a:fld id="{94826113-A126-4081-8B9E-CD62F364118C}" type="datetimeFigureOut">
               <a:rPr lang="mk-MK" smtClean="0"/>
-              <a:t>24.12.2022</a:t>
+              <a:t>29.12.2022</a:t>
             </a:fld>
             <a:endParaRPr lang="mk-MK"/>
           </a:p>
@@ -22447,7 +21662,7 @@
           <a:p>
             <a:fld id="{94826113-A126-4081-8B9E-CD62F364118C}" type="datetimeFigureOut">
               <a:rPr lang="mk-MK" smtClean="0"/>
-              <a:t>24.12.2022</a:t>
+              <a:t>29.12.2022</a:t>
             </a:fld>
             <a:endParaRPr lang="mk-MK"/>
           </a:p>
@@ -22875,7 +22090,7 @@
           <a:p>
             <a:fld id="{94826113-A126-4081-8B9E-CD62F364118C}" type="datetimeFigureOut">
               <a:rPr lang="mk-MK" smtClean="0"/>
-              <a:t>24.12.2022</a:t>
+              <a:t>29.12.2022</a:t>
             </a:fld>
             <a:endParaRPr lang="mk-MK"/>
           </a:p>
@@ -23425,7 +22640,7 @@
           <a:p>
             <a:fld id="{94826113-A126-4081-8B9E-CD62F364118C}" type="datetimeFigureOut">
               <a:rPr lang="mk-MK" smtClean="0"/>
-              <a:t>24.12.2022</a:t>
+              <a:t>29.12.2022</a:t>
             </a:fld>
             <a:endParaRPr lang="mk-MK"/>
           </a:p>
@@ -24215,7 +23430,7 @@
           <a:p>
             <a:fld id="{94826113-A126-4081-8B9E-CD62F364118C}" type="datetimeFigureOut">
               <a:rPr lang="mk-MK" smtClean="0"/>
-              <a:t>24.12.2022</a:t>
+              <a:t>29.12.2022</a:t>
             </a:fld>
             <a:endParaRPr lang="mk-MK"/>
           </a:p>
@@ -24394,7 +23609,7 @@
           <a:p>
             <a:fld id="{94826113-A126-4081-8B9E-CD62F364118C}" type="datetimeFigureOut">
               <a:rPr lang="mk-MK" smtClean="0"/>
-              <a:t>24.12.2022</a:t>
+              <a:t>29.12.2022</a:t>
             </a:fld>
             <a:endParaRPr lang="mk-MK"/>
           </a:p>
@@ -24578,7 +23793,7 @@
           <a:p>
             <a:fld id="{94826113-A126-4081-8B9E-CD62F364118C}" type="datetimeFigureOut">
               <a:rPr lang="mk-MK" smtClean="0"/>
-              <a:t>24.12.2022</a:t>
+              <a:t>29.12.2022</a:t>
             </a:fld>
             <a:endParaRPr lang="mk-MK"/>
           </a:p>
@@ -24753,7 +23968,7 @@
           <a:p>
             <a:fld id="{94826113-A126-4081-8B9E-CD62F364118C}" type="datetimeFigureOut">
               <a:rPr lang="mk-MK" smtClean="0"/>
-              <a:t>24.12.2022</a:t>
+              <a:t>29.12.2022</a:t>
             </a:fld>
             <a:endParaRPr lang="mk-MK"/>
           </a:p>
@@ -25003,7 +24218,7 @@
           <a:p>
             <a:fld id="{94826113-A126-4081-8B9E-CD62F364118C}" type="datetimeFigureOut">
               <a:rPr lang="mk-MK" smtClean="0"/>
-              <a:t>24.12.2022</a:t>
+              <a:t>29.12.2022</a:t>
             </a:fld>
             <a:endParaRPr lang="mk-MK"/>
           </a:p>
@@ -25240,7 +24455,7 @@
           <a:p>
             <a:fld id="{94826113-A126-4081-8B9E-CD62F364118C}" type="datetimeFigureOut">
               <a:rPr lang="mk-MK" smtClean="0"/>
-              <a:t>24.12.2022</a:t>
+              <a:t>29.12.2022</a:t>
             </a:fld>
             <a:endParaRPr lang="mk-MK"/>
           </a:p>
@@ -25625,7 +24840,7 @@
           <a:p>
             <a:fld id="{94826113-A126-4081-8B9E-CD62F364118C}" type="datetimeFigureOut">
               <a:rPr lang="mk-MK" smtClean="0"/>
-              <a:t>24.12.2022</a:t>
+              <a:t>29.12.2022</a:t>
             </a:fld>
             <a:endParaRPr lang="mk-MK"/>
           </a:p>
@@ -25743,7 +24958,7 @@
           <a:p>
             <a:fld id="{94826113-A126-4081-8B9E-CD62F364118C}" type="datetimeFigureOut">
               <a:rPr lang="mk-MK" smtClean="0"/>
-              <a:t>24.12.2022</a:t>
+              <a:t>29.12.2022</a:t>
             </a:fld>
             <a:endParaRPr lang="mk-MK"/>
           </a:p>
@@ -25838,7 +25053,7 @@
           <a:p>
             <a:fld id="{94826113-A126-4081-8B9E-CD62F364118C}" type="datetimeFigureOut">
               <a:rPr lang="mk-MK" smtClean="0"/>
-              <a:t>24.12.2022</a:t>
+              <a:t>29.12.2022</a:t>
             </a:fld>
             <a:endParaRPr lang="mk-MK"/>
           </a:p>
@@ -26091,7 +25306,7 @@
           <a:p>
             <a:fld id="{94826113-A126-4081-8B9E-CD62F364118C}" type="datetimeFigureOut">
               <a:rPr lang="mk-MK" smtClean="0"/>
-              <a:t>24.12.2022</a:t>
+              <a:t>29.12.2022</a:t>
             </a:fld>
             <a:endParaRPr lang="mk-MK"/>
           </a:p>
@@ -26360,7 +25575,7 @@
           <a:p>
             <a:fld id="{94826113-A126-4081-8B9E-CD62F364118C}" type="datetimeFigureOut">
               <a:rPr lang="mk-MK" smtClean="0"/>
-              <a:t>24.12.2022</a:t>
+              <a:t>29.12.2022</a:t>
             </a:fld>
             <a:endParaRPr lang="mk-MK"/>
           </a:p>
@@ -26764,7 +25979,7 @@
           <a:p>
             <a:fld id="{94826113-A126-4081-8B9E-CD62F364118C}" type="datetimeFigureOut">
               <a:rPr lang="mk-MK" smtClean="0"/>
-              <a:t>24.12.2022</a:t>
+              <a:t>29.12.2022</a:t>
             </a:fld>
             <a:endParaRPr lang="mk-MK"/>
           </a:p>
@@ -27258,7 +26473,7 @@
           <p:cNvPr id="2" name="Title 1">
             <a:extLst>
               <a:ext uri="{FF2B5EF4-FFF2-40B4-BE49-F238E27FC236}">
-                <a16:creationId xmlns:a16="http://schemas.microsoft.com/office/drawing/2014/main" xmlns="" id="{032C4FD0-D85C-4101-8123-727111AE15E8}"/>
+                <a16:creationId xmlns="" xmlns:a16="http://schemas.microsoft.com/office/drawing/2014/main" id="{032C4FD0-D85C-4101-8123-727111AE15E8}"/>
               </a:ext>
             </a:extLst>
           </p:cNvPr>
@@ -27318,7 +26533,7 @@
           <p:cNvPr id="5" name="Title 1">
             <a:extLst>
               <a:ext uri="{FF2B5EF4-FFF2-40B4-BE49-F238E27FC236}">
-                <a16:creationId xmlns:a16="http://schemas.microsoft.com/office/drawing/2014/main" xmlns="" id="{032C4FD0-D85C-4101-8123-727111AE15E8}"/>
+                <a16:creationId xmlns="" xmlns:a16="http://schemas.microsoft.com/office/drawing/2014/main" id="{032C4FD0-D85C-4101-8123-727111AE15E8}"/>
               </a:ext>
             </a:extLst>
           </p:cNvPr>
@@ -27398,7 +26613,7 @@
           <p:cNvPr id="6" name="Title 1">
             <a:extLst>
               <a:ext uri="{FF2B5EF4-FFF2-40B4-BE49-F238E27FC236}">
-                <a16:creationId xmlns:a16="http://schemas.microsoft.com/office/drawing/2014/main" xmlns="" id="{032C4FD0-D85C-4101-8123-727111AE15E8}"/>
+                <a16:creationId xmlns="" xmlns:a16="http://schemas.microsoft.com/office/drawing/2014/main" id="{032C4FD0-D85C-4101-8123-727111AE15E8}"/>
               </a:ext>
             </a:extLst>
           </p:cNvPr>
@@ -27485,7 +26700,7 @@
           <p:cNvPr id="8" name="Title 1">
             <a:extLst>
               <a:ext uri="{FF2B5EF4-FFF2-40B4-BE49-F238E27FC236}">
-                <a16:creationId xmlns:a16="http://schemas.microsoft.com/office/drawing/2014/main" xmlns="" id="{032C4FD0-D85C-4101-8123-727111AE15E8}"/>
+                <a16:creationId xmlns="" xmlns:a16="http://schemas.microsoft.com/office/drawing/2014/main" id="{032C4FD0-D85C-4101-8123-727111AE15E8}"/>
               </a:ext>
             </a:extLst>
           </p:cNvPr>
@@ -27707,7 +26922,7 @@
           <p:cNvPr id="2" name="Title 1">
             <a:extLst>
               <a:ext uri="{FF2B5EF4-FFF2-40B4-BE49-F238E27FC236}">
-                <a16:creationId xmlns:a16="http://schemas.microsoft.com/office/drawing/2014/main" xmlns="" id="{6D3737C0-C355-4BA9-B315-89CE0161DDB9}"/>
+                <a16:creationId xmlns="" xmlns:a16="http://schemas.microsoft.com/office/drawing/2014/main" id="{6D3737C0-C355-4BA9-B315-89CE0161DDB9}"/>
               </a:ext>
             </a:extLst>
           </p:cNvPr>
@@ -27735,7 +26950,7 @@
           <p:cNvPr id="3" name="Content Placeholder 2">
             <a:extLst>
               <a:ext uri="{FF2B5EF4-FFF2-40B4-BE49-F238E27FC236}">
-                <a16:creationId xmlns:a16="http://schemas.microsoft.com/office/drawing/2014/main" xmlns="" id="{EAE69831-29EE-4467-BCD6-CC9FA48EC592}"/>
+                <a16:creationId xmlns="" xmlns:a16="http://schemas.microsoft.com/office/drawing/2014/main" id="{EAE69831-29EE-4467-BCD6-CC9FA48EC592}"/>
               </a:ext>
             </a:extLst>
           </p:cNvPr>
@@ -27811,25 +27026,13 @@
               <a:rPr lang="mk-MK" sz="2600" dirty="0" smtClean="0">
                 <a:ea typeface="Times New Roman" panose="02020603050405020304" pitchFamily="18" charset="0"/>
               </a:rPr>
-              <a:t>проектот ги употребува </a:t>
-            </a:r>
-            <a:r>
-              <a:rPr lang="mk-MK" sz="2600" dirty="0" smtClean="0">
-                <a:ea typeface="Times New Roman" panose="02020603050405020304" pitchFamily="18" charset="0"/>
-              </a:rPr>
-              <a:t>библиотеките </a:t>
+              <a:t>проектот ги употребува библиотеките </a:t>
             </a:r>
             <a:r>
               <a:rPr lang="en-US" sz="2600" dirty="0" smtClean="0">
                 <a:ea typeface="Times New Roman" panose="02020603050405020304" pitchFamily="18" charset="0"/>
               </a:rPr>
-              <a:t>pybullet</a:t>
-            </a:r>
-            <a:r>
-              <a:rPr lang="en-US" sz="2600" dirty="0" smtClean="0">
-                <a:ea typeface="Times New Roman" panose="02020603050405020304" pitchFamily="18" charset="0"/>
-              </a:rPr>
-              <a:t>, sympy </a:t>
+              <a:t>pybullet, sympy </a:t>
             </a:r>
             <a:r>
               <a:rPr lang="mk-MK" sz="2600" dirty="0">
@@ -27969,7 +27172,7 @@
             <p:ph sz="quarter" idx="13"/>
             <p:extLst>
               <p:ext uri="{D42A27DB-BD31-4B8C-83A1-F6EECF244321}">
-                <p14:modId xmlns:p14="http://schemas.microsoft.com/office/powerpoint/2010/main" val="3753952809"/>
+                <p14:modId xmlns:p14="http://schemas.microsoft.com/office/powerpoint/2010/main" val="1521987446"/>
               </p:ext>
             </p:extLst>
           </p:nvPr>
@@ -28143,7 +27346,7 @@
             <p:ph sz="quarter" idx="13"/>
             <p:extLst>
               <p:ext uri="{D42A27DB-BD31-4B8C-83A1-F6EECF244321}">
-                <p14:modId xmlns:p14="http://schemas.microsoft.com/office/powerpoint/2010/main" val="3863112656"/>
+                <p14:modId xmlns:p14="http://schemas.microsoft.com/office/powerpoint/2010/main" val="3095881317"/>
               </p:ext>
             </p:extLst>
           </p:nvPr>

</xml_diff>